<commit_message>
Update to powerpoint, Added slide 2
</commit_message>
<xml_diff>
--- a/Kugel_Ken/Intro_PowerPoint.pptx
+++ b/Kugel_Ken/Intro_PowerPoint.pptx
@@ -6,6 +6,7 @@
   </p:sldMasterIdLst>
   <p:sldIdLst>
     <p:sldId id="256" r:id="rId2"/>
+    <p:sldId id="257" r:id="rId3"/>
   </p:sldIdLst>
   <p:sldSz cx="12192000" cy="6858000"/>
   <p:notesSz cx="6858000" cy="9144000"/>
@@ -104,6 +105,11 @@
       </a:defRPr>
     </a:lvl9pPr>
   </p:defaultTextStyle>
+  <p:extLst>
+    <p:ext uri="{EFAFB233-063F-42B5-8137-9DF3F51BA10A}">
+      <p15:sldGuideLst xmlns:p15="http://schemas.microsoft.com/office/powerpoint/2012/main"/>
+    </p:ext>
+  </p:extLst>
 </p:presentation>
 </file>
 
@@ -254,7 +260,7 @@
           <a:p>
             <a:fld id="{977EAC19-934E-46FD-AC2C-354BC8619869}" type="datetimeFigureOut">
               <a:rPr lang="en-US" smtClean="0"/>
-              <a:t>9/13/2023</a:t>
+              <a:t>9/14/2023</a:t>
             </a:fld>
             <a:endParaRPr lang="en-US"/>
           </a:p>
@@ -452,7 +458,7 @@
           <a:p>
             <a:fld id="{977EAC19-934E-46FD-AC2C-354BC8619869}" type="datetimeFigureOut">
               <a:rPr lang="en-US" smtClean="0"/>
-              <a:t>9/13/2023</a:t>
+              <a:t>9/14/2023</a:t>
             </a:fld>
             <a:endParaRPr lang="en-US"/>
           </a:p>
@@ -660,7 +666,7 @@
           <a:p>
             <a:fld id="{977EAC19-934E-46FD-AC2C-354BC8619869}" type="datetimeFigureOut">
               <a:rPr lang="en-US" smtClean="0"/>
-              <a:t>9/13/2023</a:t>
+              <a:t>9/14/2023</a:t>
             </a:fld>
             <a:endParaRPr lang="en-US"/>
           </a:p>
@@ -858,7 +864,7 @@
           <a:p>
             <a:fld id="{977EAC19-934E-46FD-AC2C-354BC8619869}" type="datetimeFigureOut">
               <a:rPr lang="en-US" smtClean="0"/>
-              <a:t>9/13/2023</a:t>
+              <a:t>9/14/2023</a:t>
             </a:fld>
             <a:endParaRPr lang="en-US"/>
           </a:p>
@@ -1133,7 +1139,7 @@
           <a:p>
             <a:fld id="{977EAC19-934E-46FD-AC2C-354BC8619869}" type="datetimeFigureOut">
               <a:rPr lang="en-US" smtClean="0"/>
-              <a:t>9/13/2023</a:t>
+              <a:t>9/14/2023</a:t>
             </a:fld>
             <a:endParaRPr lang="en-US"/>
           </a:p>
@@ -1398,7 +1404,7 @@
           <a:p>
             <a:fld id="{977EAC19-934E-46FD-AC2C-354BC8619869}" type="datetimeFigureOut">
               <a:rPr lang="en-US" smtClean="0"/>
-              <a:t>9/13/2023</a:t>
+              <a:t>9/14/2023</a:t>
             </a:fld>
             <a:endParaRPr lang="en-US"/>
           </a:p>
@@ -1810,7 +1816,7 @@
           <a:p>
             <a:fld id="{977EAC19-934E-46FD-AC2C-354BC8619869}" type="datetimeFigureOut">
               <a:rPr lang="en-US" smtClean="0"/>
-              <a:t>9/13/2023</a:t>
+              <a:t>9/14/2023</a:t>
             </a:fld>
             <a:endParaRPr lang="en-US"/>
           </a:p>
@@ -1951,7 +1957,7 @@
           <a:p>
             <a:fld id="{977EAC19-934E-46FD-AC2C-354BC8619869}" type="datetimeFigureOut">
               <a:rPr lang="en-US" smtClean="0"/>
-              <a:t>9/13/2023</a:t>
+              <a:t>9/14/2023</a:t>
             </a:fld>
             <a:endParaRPr lang="en-US"/>
           </a:p>
@@ -2064,7 +2070,7 @@
           <a:p>
             <a:fld id="{977EAC19-934E-46FD-AC2C-354BC8619869}" type="datetimeFigureOut">
               <a:rPr lang="en-US" smtClean="0"/>
-              <a:t>9/13/2023</a:t>
+              <a:t>9/14/2023</a:t>
             </a:fld>
             <a:endParaRPr lang="en-US"/>
           </a:p>
@@ -2375,7 +2381,7 @@
           <a:p>
             <a:fld id="{977EAC19-934E-46FD-AC2C-354BC8619869}" type="datetimeFigureOut">
               <a:rPr lang="en-US" smtClean="0"/>
-              <a:t>9/13/2023</a:t>
+              <a:t>9/14/2023</a:t>
             </a:fld>
             <a:endParaRPr lang="en-US"/>
           </a:p>
@@ -2663,7 +2669,7 @@
           <a:p>
             <a:fld id="{977EAC19-934E-46FD-AC2C-354BC8619869}" type="datetimeFigureOut">
               <a:rPr lang="en-US" smtClean="0"/>
-              <a:t>9/13/2023</a:t>
+              <a:t>9/14/2023</a:t>
             </a:fld>
             <a:endParaRPr lang="en-US"/>
           </a:p>
@@ -2904,7 +2910,7 @@
           <a:p>
             <a:fld id="{977EAC19-934E-46FD-AC2C-354BC8619869}" type="datetimeFigureOut">
               <a:rPr lang="en-US" smtClean="0"/>
-              <a:t>9/13/2023</a:t>
+              <a:t>9/14/2023</a:t>
             </a:fld>
             <a:endParaRPr lang="en-US"/>
           </a:p>
@@ -3543,6 +3549,440 @@
 </p:sld>
 </file>
 
+<file path=ppt/slides/slide2.xml><?xml version="1.0" encoding="utf-8"?>
+<p:sld xmlns:a="http://schemas.openxmlformats.org/drawingml/2006/main" xmlns:r="http://schemas.openxmlformats.org/officeDocument/2006/relationships" xmlns:p="http://schemas.openxmlformats.org/presentationml/2006/main">
+  <p:cSld>
+    <p:bg>
+      <p:bgPr>
+        <a:solidFill>
+          <a:schemeClr val="accent1">
+            <a:lumMod val="40000"/>
+            <a:lumOff val="60000"/>
+          </a:schemeClr>
+        </a:solidFill>
+        <a:effectLst/>
+      </p:bgPr>
+    </p:bg>
+    <p:spTree>
+      <p:nvGrpSpPr>
+        <p:cNvPr id="1" name=""/>
+        <p:cNvGrpSpPr/>
+        <p:nvPr/>
+      </p:nvGrpSpPr>
+      <p:grpSpPr>
+        <a:xfrm>
+          <a:off x="0" y="0"/>
+          <a:ext cx="0" cy="0"/>
+          <a:chOff x="0" y="0"/>
+          <a:chExt cx="0" cy="0"/>
+        </a:xfrm>
+      </p:grpSpPr>
+      <p:sp>
+        <p:nvSpPr>
+          <p:cNvPr id="4" name="Title 3">
+            <a:extLst>
+              <a:ext uri="{FF2B5EF4-FFF2-40B4-BE49-F238E27FC236}">
+                <a16:creationId xmlns:a16="http://schemas.microsoft.com/office/drawing/2014/main" id="{5B7F1473-AE8B-DDA6-D41D-39F6709E17B1}"/>
+              </a:ext>
+            </a:extLst>
+          </p:cNvPr>
+          <p:cNvSpPr>
+            <a:spLocks noGrp="1"/>
+          </p:cNvSpPr>
+          <p:nvPr>
+            <p:ph type="title"/>
+          </p:nvPr>
+        </p:nvSpPr>
+        <p:spPr/>
+        <p:txBody>
+          <a:bodyPr/>
+          <a:lstStyle/>
+          <a:p>
+            <a:r>
+              <a:rPr lang="en-US" sz="4400" dirty="0"/>
+              <a:t>Data Types</a:t>
+            </a:r>
+          </a:p>
+        </p:txBody>
+      </p:sp>
+      <p:sp>
+        <p:nvSpPr>
+          <p:cNvPr id="5" name="Content Placeholder 4">
+            <a:extLst>
+              <a:ext uri="{FF2B5EF4-FFF2-40B4-BE49-F238E27FC236}">
+                <a16:creationId xmlns:a16="http://schemas.microsoft.com/office/drawing/2014/main" id="{B84F2956-3CCA-880B-6914-ACA691E67097}"/>
+              </a:ext>
+            </a:extLst>
+          </p:cNvPr>
+          <p:cNvSpPr>
+            <a:spLocks noGrp="1"/>
+          </p:cNvSpPr>
+          <p:nvPr>
+            <p:ph idx="1"/>
+          </p:nvPr>
+        </p:nvSpPr>
+        <p:spPr>
+          <a:xfrm>
+            <a:off x="838200" y="1825625"/>
+            <a:ext cx="4736013" cy="2284412"/>
+          </a:xfrm>
+        </p:spPr>
+        <p:txBody>
+          <a:bodyPr>
+            <a:normAutofit/>
+          </a:bodyPr>
+          <a:lstStyle/>
+          <a:p>
+            <a:r>
+              <a:rPr lang="en-US" dirty="0" err="1"/>
+              <a:t>Fastq</a:t>
+            </a:r>
+            <a:endParaRPr lang="en-US" dirty="0"/>
+          </a:p>
+          <a:p>
+            <a:pPr lvl="1"/>
+            <a:r>
+              <a:rPr lang="en-US" dirty="0"/>
+              <a:t>Essentially complex sequencing files</a:t>
+            </a:r>
+          </a:p>
+        </p:txBody>
+      </p:sp>
+      <p:pic>
+        <p:nvPicPr>
+          <p:cNvPr id="3" name="Picture 2" descr="A diagram of a dna sequence&#10;&#10;Description automatically generated">
+            <a:extLst>
+              <a:ext uri="{FF2B5EF4-FFF2-40B4-BE49-F238E27FC236}">
+                <a16:creationId xmlns:a16="http://schemas.microsoft.com/office/drawing/2014/main" id="{BFFA5A79-9739-2EF1-FE56-5C17B65BD3FE}"/>
+              </a:ext>
+            </a:extLst>
+          </p:cNvPr>
+          <p:cNvPicPr>
+            <a:picLocks noChangeAspect="1"/>
+          </p:cNvPicPr>
+          <p:nvPr/>
+        </p:nvPicPr>
+        <p:blipFill>
+          <a:blip r:embed="rId2">
+            <a:extLst>
+              <a:ext uri="{28A0092B-C50C-407E-A947-70E740481C1C}">
+                <a14:useLocalDpi xmlns:a14="http://schemas.microsoft.com/office/drawing/2010/main" val="0"/>
+              </a:ext>
+            </a:extLst>
+          </a:blip>
+          <a:stretch>
+            <a:fillRect/>
+          </a:stretch>
+        </p:blipFill>
+        <p:spPr>
+          <a:xfrm>
+            <a:off x="94386" y="3503608"/>
+            <a:ext cx="4684414" cy="2623272"/>
+          </a:xfrm>
+          <a:prstGeom prst="rect">
+            <a:avLst/>
+          </a:prstGeom>
+        </p:spPr>
+      </p:pic>
+      <p:sp>
+        <p:nvSpPr>
+          <p:cNvPr id="6" name="Content Placeholder 4">
+            <a:extLst>
+              <a:ext uri="{FF2B5EF4-FFF2-40B4-BE49-F238E27FC236}">
+                <a16:creationId xmlns:a16="http://schemas.microsoft.com/office/drawing/2014/main" id="{66EC6738-22BD-2B19-2880-0901E7CB50C9}"/>
+              </a:ext>
+            </a:extLst>
+          </p:cNvPr>
+          <p:cNvSpPr txBox="1">
+            <a:spLocks/>
+          </p:cNvSpPr>
+          <p:nvPr/>
+        </p:nvSpPr>
+        <p:spPr>
+          <a:xfrm>
+            <a:off x="6473524" y="1825625"/>
+            <a:ext cx="4736013" cy="2284412"/>
+          </a:xfrm>
+          <a:prstGeom prst="rect">
+            <a:avLst/>
+          </a:prstGeom>
+        </p:spPr>
+        <p:txBody>
+          <a:bodyPr vert="horz" lIns="91440" tIns="45720" rIns="91440" bIns="45720" rtlCol="0">
+            <a:normAutofit/>
+          </a:bodyPr>
+          <a:lstStyle>
+            <a:lvl1pPr marL="228600" indent="-228600" algn="l" defTabSz="914400" rtl="0" eaLnBrk="1" latinLnBrk="0" hangingPunct="1">
+              <a:lnSpc>
+                <a:spcPct val="90000"/>
+              </a:lnSpc>
+              <a:spcBef>
+                <a:spcPts val="1000"/>
+              </a:spcBef>
+              <a:buFont typeface="Arial" panose="020B0604020202020204" pitchFamily="34" charset="0"/>
+              <a:buChar char="•"/>
+              <a:defRPr sz="2800" kern="1200">
+                <a:solidFill>
+                  <a:schemeClr val="tx1"/>
+                </a:solidFill>
+                <a:latin typeface="+mn-lt"/>
+                <a:ea typeface="+mn-ea"/>
+                <a:cs typeface="+mn-cs"/>
+              </a:defRPr>
+            </a:lvl1pPr>
+            <a:lvl2pPr marL="685800" indent="-228600" algn="l" defTabSz="914400" rtl="0" eaLnBrk="1" latinLnBrk="0" hangingPunct="1">
+              <a:lnSpc>
+                <a:spcPct val="90000"/>
+              </a:lnSpc>
+              <a:spcBef>
+                <a:spcPts val="500"/>
+              </a:spcBef>
+              <a:buFont typeface="Arial" panose="020B0604020202020204" pitchFamily="34" charset="0"/>
+              <a:buChar char="•"/>
+              <a:defRPr sz="2400" kern="1200">
+                <a:solidFill>
+                  <a:schemeClr val="tx1"/>
+                </a:solidFill>
+                <a:latin typeface="+mn-lt"/>
+                <a:ea typeface="+mn-ea"/>
+                <a:cs typeface="+mn-cs"/>
+              </a:defRPr>
+            </a:lvl2pPr>
+            <a:lvl3pPr marL="1143000" indent="-228600" algn="l" defTabSz="914400" rtl="0" eaLnBrk="1" latinLnBrk="0" hangingPunct="1">
+              <a:lnSpc>
+                <a:spcPct val="90000"/>
+              </a:lnSpc>
+              <a:spcBef>
+                <a:spcPts val="500"/>
+              </a:spcBef>
+              <a:buFont typeface="Arial" panose="020B0604020202020204" pitchFamily="34" charset="0"/>
+              <a:buChar char="•"/>
+              <a:defRPr sz="2000" kern="1200">
+                <a:solidFill>
+                  <a:schemeClr val="tx1"/>
+                </a:solidFill>
+                <a:latin typeface="+mn-lt"/>
+                <a:ea typeface="+mn-ea"/>
+                <a:cs typeface="+mn-cs"/>
+              </a:defRPr>
+            </a:lvl3pPr>
+            <a:lvl4pPr marL="1600200" indent="-228600" algn="l" defTabSz="914400" rtl="0" eaLnBrk="1" latinLnBrk="0" hangingPunct="1">
+              <a:lnSpc>
+                <a:spcPct val="90000"/>
+              </a:lnSpc>
+              <a:spcBef>
+                <a:spcPts val="500"/>
+              </a:spcBef>
+              <a:buFont typeface="Arial" panose="020B0604020202020204" pitchFamily="34" charset="0"/>
+              <a:buChar char="•"/>
+              <a:defRPr sz="1800" kern="1200">
+                <a:solidFill>
+                  <a:schemeClr val="tx1"/>
+                </a:solidFill>
+                <a:latin typeface="+mn-lt"/>
+                <a:ea typeface="+mn-ea"/>
+                <a:cs typeface="+mn-cs"/>
+              </a:defRPr>
+            </a:lvl4pPr>
+            <a:lvl5pPr marL="2057400" indent="-228600" algn="l" defTabSz="914400" rtl="0" eaLnBrk="1" latinLnBrk="0" hangingPunct="1">
+              <a:lnSpc>
+                <a:spcPct val="90000"/>
+              </a:lnSpc>
+              <a:spcBef>
+                <a:spcPts val="500"/>
+              </a:spcBef>
+              <a:buFont typeface="Arial" panose="020B0604020202020204" pitchFamily="34" charset="0"/>
+              <a:buChar char="•"/>
+              <a:defRPr sz="1800" kern="1200">
+                <a:solidFill>
+                  <a:schemeClr val="tx1"/>
+                </a:solidFill>
+                <a:latin typeface="+mn-lt"/>
+                <a:ea typeface="+mn-ea"/>
+                <a:cs typeface="+mn-cs"/>
+              </a:defRPr>
+            </a:lvl5pPr>
+            <a:lvl6pPr marL="2514600" indent="-228600" algn="l" defTabSz="914400" rtl="0" eaLnBrk="1" latinLnBrk="0" hangingPunct="1">
+              <a:lnSpc>
+                <a:spcPct val="90000"/>
+              </a:lnSpc>
+              <a:spcBef>
+                <a:spcPts val="500"/>
+              </a:spcBef>
+              <a:buFont typeface="Arial" panose="020B0604020202020204" pitchFamily="34" charset="0"/>
+              <a:buChar char="•"/>
+              <a:defRPr sz="1800" kern="1200">
+                <a:solidFill>
+                  <a:schemeClr val="tx1"/>
+                </a:solidFill>
+                <a:latin typeface="+mn-lt"/>
+                <a:ea typeface="+mn-ea"/>
+                <a:cs typeface="+mn-cs"/>
+              </a:defRPr>
+            </a:lvl6pPr>
+            <a:lvl7pPr marL="2971800" indent="-228600" algn="l" defTabSz="914400" rtl="0" eaLnBrk="1" latinLnBrk="0" hangingPunct="1">
+              <a:lnSpc>
+                <a:spcPct val="90000"/>
+              </a:lnSpc>
+              <a:spcBef>
+                <a:spcPts val="500"/>
+              </a:spcBef>
+              <a:buFont typeface="Arial" panose="020B0604020202020204" pitchFamily="34" charset="0"/>
+              <a:buChar char="•"/>
+              <a:defRPr sz="1800" kern="1200">
+                <a:solidFill>
+                  <a:schemeClr val="tx1"/>
+                </a:solidFill>
+                <a:latin typeface="+mn-lt"/>
+                <a:ea typeface="+mn-ea"/>
+                <a:cs typeface="+mn-cs"/>
+              </a:defRPr>
+            </a:lvl7pPr>
+            <a:lvl8pPr marL="3429000" indent="-228600" algn="l" defTabSz="914400" rtl="0" eaLnBrk="1" latinLnBrk="0" hangingPunct="1">
+              <a:lnSpc>
+                <a:spcPct val="90000"/>
+              </a:lnSpc>
+              <a:spcBef>
+                <a:spcPts val="500"/>
+              </a:spcBef>
+              <a:buFont typeface="Arial" panose="020B0604020202020204" pitchFamily="34" charset="0"/>
+              <a:buChar char="•"/>
+              <a:defRPr sz="1800" kern="1200">
+                <a:solidFill>
+                  <a:schemeClr val="tx1"/>
+                </a:solidFill>
+                <a:latin typeface="+mn-lt"/>
+                <a:ea typeface="+mn-ea"/>
+                <a:cs typeface="+mn-cs"/>
+              </a:defRPr>
+            </a:lvl8pPr>
+            <a:lvl9pPr marL="3886200" indent="-228600" algn="l" defTabSz="914400" rtl="0" eaLnBrk="1" latinLnBrk="0" hangingPunct="1">
+              <a:lnSpc>
+                <a:spcPct val="90000"/>
+              </a:lnSpc>
+              <a:spcBef>
+                <a:spcPts val="500"/>
+              </a:spcBef>
+              <a:buFont typeface="Arial" panose="020B0604020202020204" pitchFamily="34" charset="0"/>
+              <a:buChar char="•"/>
+              <a:defRPr sz="1800" kern="1200">
+                <a:solidFill>
+                  <a:schemeClr val="tx1"/>
+                </a:solidFill>
+                <a:latin typeface="+mn-lt"/>
+                <a:ea typeface="+mn-ea"/>
+                <a:cs typeface="+mn-cs"/>
+              </a:defRPr>
+            </a:lvl9pPr>
+          </a:lstStyle>
+          <a:p>
+            <a:r>
+              <a:rPr lang="en-US" dirty="0"/>
+              <a:t>Metadata (Excel)</a:t>
+            </a:r>
+          </a:p>
+          <a:p>
+            <a:pPr lvl="1"/>
+            <a:r>
+              <a:rPr lang="en-US" dirty="0"/>
+              <a:t>Excel file with columns and rows of information (similar to the homework 1)</a:t>
+            </a:r>
+          </a:p>
+        </p:txBody>
+      </p:sp>
+      <p:pic>
+        <p:nvPicPr>
+          <p:cNvPr id="10" name="Picture 9" descr="A blue screen with white numbers&#10;&#10;Description automatically generated">
+            <a:extLst>
+              <a:ext uri="{FF2B5EF4-FFF2-40B4-BE49-F238E27FC236}">
+                <a16:creationId xmlns:a16="http://schemas.microsoft.com/office/drawing/2014/main" id="{C62AD6E1-2E4F-A127-3025-2A7D31B51A05}"/>
+              </a:ext>
+            </a:extLst>
+          </p:cNvPr>
+          <p:cNvPicPr>
+            <a:picLocks noChangeAspect="1"/>
+          </p:cNvPicPr>
+          <p:nvPr/>
+        </p:nvPicPr>
+        <p:blipFill>
+          <a:blip r:embed="rId3">
+            <a:extLst>
+              <a:ext uri="{28A0092B-C50C-407E-A947-70E740481C1C}">
+                <a14:useLocalDpi xmlns:a14="http://schemas.microsoft.com/office/drawing/2010/main" val="0"/>
+              </a:ext>
+            </a:extLst>
+          </a:blip>
+          <a:stretch>
+            <a:fillRect/>
+          </a:stretch>
+        </p:blipFill>
+        <p:spPr>
+          <a:xfrm>
+            <a:off x="5882791" y="3503608"/>
+            <a:ext cx="2421935" cy="3136729"/>
+          </a:xfrm>
+          <a:prstGeom prst="rect">
+            <a:avLst/>
+          </a:prstGeom>
+        </p:spPr>
+      </p:pic>
+      <p:cxnSp>
+        <p:nvCxnSpPr>
+          <p:cNvPr id="12" name="Straight Arrow Connector 11">
+            <a:extLst>
+              <a:ext uri="{FF2B5EF4-FFF2-40B4-BE49-F238E27FC236}">
+                <a16:creationId xmlns:a16="http://schemas.microsoft.com/office/drawing/2014/main" id="{CC39742E-F154-12AF-8059-C139A3F14340}"/>
+              </a:ext>
+            </a:extLst>
+          </p:cNvPr>
+          <p:cNvCxnSpPr>
+            <a:stCxn id="3" idx="3"/>
+          </p:cNvCxnSpPr>
+          <p:nvPr/>
+        </p:nvCxnSpPr>
+        <p:spPr>
+          <a:xfrm>
+            <a:off x="4778800" y="4815244"/>
+            <a:ext cx="899311" cy="0"/>
+          </a:xfrm>
+          <a:prstGeom prst="straightConnector1">
+            <a:avLst/>
+          </a:prstGeom>
+          <a:ln w="38100">
+            <a:solidFill>
+              <a:schemeClr val="tx1"/>
+            </a:solidFill>
+            <a:tailEnd type="triangle"/>
+          </a:ln>
+        </p:spPr>
+        <p:style>
+          <a:lnRef idx="1">
+            <a:schemeClr val="accent1"/>
+          </a:lnRef>
+          <a:fillRef idx="0">
+            <a:schemeClr val="accent1"/>
+          </a:fillRef>
+          <a:effectRef idx="0">
+            <a:schemeClr val="accent1"/>
+          </a:effectRef>
+          <a:fontRef idx="minor">
+            <a:schemeClr val="tx1"/>
+          </a:fontRef>
+        </p:style>
+      </p:cxnSp>
+    </p:spTree>
+    <p:extLst>
+      <p:ext uri="{BB962C8B-B14F-4D97-AF65-F5344CB8AC3E}">
+        <p14:creationId xmlns:p14="http://schemas.microsoft.com/office/powerpoint/2010/main" val="1433524095"/>
+      </p:ext>
+    </p:extLst>
+  </p:cSld>
+  <p:clrMapOvr>
+    <a:masterClrMapping/>
+  </p:clrMapOvr>
+</p:sld>
+</file>
+
 <file path=ppt/theme/theme1.xml><?xml version="1.0" encoding="utf-8"?>
 <a:theme xmlns:a="http://schemas.openxmlformats.org/drawingml/2006/main" name="Office Theme">
   <a:themeElements>

</xml_diff>